<commit_message>
remove acknowledgement and rebuild
</commit_message>
<xml_diff>
--- a/_book/plot/consumer-education-pie-1.pptx
+++ b/_book/plot/consumer-education-pie-1.pptx
@@ -3192,8 +3192,8 @@
           </p:nvSpPr>
           <p:spPr>
             <a:xfrm>
-              <a:off x="2019661" y="1590617"/>
-              <a:ext cx="6917431" cy="4055309"/>
+              <a:off x="2017917" y="1590617"/>
+              <a:ext cx="6919174" cy="4059006"/>
             </a:xfrm>
             <a:prstGeom prst="rect">
               <a:avLst/>
@@ -3218,15 +3218,15 @@
           </p:nvSpPr>
           <p:spPr>
             <a:xfrm>
-              <a:off x="2818271" y="1590617"/>
-              <a:ext cx="0" cy="4055309"/>
+              <a:off x="2816728" y="1590617"/>
+              <a:ext cx="0" cy="4059006"/>
             </a:xfrm>
             <a:custGeom>
               <a:avLst/>
               <a:pathLst>
-                <a:path w="0" h="4055309">
+                <a:path w="0" h="4059006">
                   <a:moveTo>
-                    <a:pt x="0" y="4055309"/>
+                    <a:pt x="0" y="4059006"/>
                   </a:moveTo>
                   <a:lnTo>
                     <a:pt x="0" y="0"/>
@@ -3261,15 +3261,15 @@
           </p:nvSpPr>
           <p:spPr>
             <a:xfrm>
-              <a:off x="4415490" y="1590617"/>
-              <a:ext cx="0" cy="4055309"/>
+              <a:off x="4414351" y="1590617"/>
+              <a:ext cx="0" cy="4059006"/>
             </a:xfrm>
             <a:custGeom>
               <a:avLst/>
               <a:pathLst>
-                <a:path w="0" h="4055309">
+                <a:path w="0" h="4059006">
                   <a:moveTo>
-                    <a:pt x="0" y="4055309"/>
+                    <a:pt x="0" y="4059006"/>
                   </a:moveTo>
                   <a:lnTo>
                     <a:pt x="0" y="0"/>
@@ -3304,15 +3304,15 @@
           </p:nvSpPr>
           <p:spPr>
             <a:xfrm>
-              <a:off x="6012710" y="1590617"/>
-              <a:ext cx="0" cy="4055309"/>
+              <a:off x="6011973" y="1590617"/>
+              <a:ext cx="0" cy="4059006"/>
             </a:xfrm>
             <a:custGeom>
               <a:avLst/>
               <a:pathLst>
-                <a:path w="0" h="4055309">
+                <a:path w="0" h="4059006">
                   <a:moveTo>
-                    <a:pt x="0" y="4055309"/>
+                    <a:pt x="0" y="4059006"/>
                   </a:moveTo>
                   <a:lnTo>
                     <a:pt x="0" y="0"/>
@@ -3347,15 +3347,15 @@
           </p:nvSpPr>
           <p:spPr>
             <a:xfrm>
-              <a:off x="7609930" y="1590617"/>
-              <a:ext cx="0" cy="4055309"/>
+              <a:off x="7609596" y="1590617"/>
+              <a:ext cx="0" cy="4059006"/>
             </a:xfrm>
             <a:custGeom>
               <a:avLst/>
               <a:pathLst>
-                <a:path w="0" h="4055309">
+                <a:path w="0" h="4059006">
                   <a:moveTo>
-                    <a:pt x="0" y="4055309"/>
+                    <a:pt x="0" y="4059006"/>
                   </a:moveTo>
                   <a:lnTo>
                     <a:pt x="0" y="0"/>
@@ -3390,21 +3390,21 @@
           </p:nvSpPr>
           <p:spPr>
             <a:xfrm>
-              <a:off x="2019661" y="5066596"/>
-              <a:ext cx="6917431" cy="0"/>
+              <a:off x="2017917" y="5069765"/>
+              <a:ext cx="6919174" cy="0"/>
             </a:xfrm>
             <a:custGeom>
               <a:avLst/>
               <a:pathLst>
-                <a:path w="6917431" h="0">
+                <a:path w="6919174" h="0">
                   <a:moveTo>
                     <a:pt x="0" y="0"/>
                   </a:moveTo>
                   <a:lnTo>
-                    <a:pt x="6917431" y="0"/>
-                  </a:lnTo>
-                  <a:lnTo>
-                    <a:pt x="6917431" y="0"/>
+                    <a:pt x="6919174" y="0"/>
+                  </a:lnTo>
+                  <a:lnTo>
+                    <a:pt x="6919174" y="0"/>
                   </a:lnTo>
                 </a:path>
               </a:pathLst>
@@ -3433,21 +3433,21 @@
           </p:nvSpPr>
           <p:spPr>
             <a:xfrm>
-              <a:off x="2019661" y="4101046"/>
-              <a:ext cx="6917431" cy="0"/>
+              <a:off x="2017917" y="4103335"/>
+              <a:ext cx="6919174" cy="0"/>
             </a:xfrm>
             <a:custGeom>
               <a:avLst/>
               <a:pathLst>
-                <a:path w="6917431" h="0">
+                <a:path w="6919174" h="0">
                   <a:moveTo>
                     <a:pt x="0" y="0"/>
                   </a:moveTo>
                   <a:lnTo>
-                    <a:pt x="6917431" y="0"/>
-                  </a:lnTo>
-                  <a:lnTo>
-                    <a:pt x="6917431" y="0"/>
+                    <a:pt x="6919174" y="0"/>
+                  </a:lnTo>
+                  <a:lnTo>
+                    <a:pt x="6919174" y="0"/>
                   </a:lnTo>
                 </a:path>
               </a:pathLst>
@@ -3476,21 +3476,21 @@
           </p:nvSpPr>
           <p:spPr>
             <a:xfrm>
-              <a:off x="2019661" y="3135496"/>
-              <a:ext cx="6917431" cy="0"/>
+              <a:off x="2017917" y="3136905"/>
+              <a:ext cx="6919174" cy="0"/>
             </a:xfrm>
             <a:custGeom>
               <a:avLst/>
               <a:pathLst>
-                <a:path w="6917431" h="0">
+                <a:path w="6919174" h="0">
                   <a:moveTo>
                     <a:pt x="0" y="0"/>
                   </a:moveTo>
                   <a:lnTo>
-                    <a:pt x="6917431" y="0"/>
-                  </a:lnTo>
-                  <a:lnTo>
-                    <a:pt x="6917431" y="0"/>
+                    <a:pt x="6919174" y="0"/>
+                  </a:lnTo>
+                  <a:lnTo>
+                    <a:pt x="6919174" y="0"/>
                   </a:lnTo>
                 </a:path>
               </a:pathLst>
@@ -3519,21 +3519,21 @@
           </p:nvSpPr>
           <p:spPr>
             <a:xfrm>
-              <a:off x="2019661" y="2169947"/>
-              <a:ext cx="6917431" cy="0"/>
+              <a:off x="2017917" y="2170475"/>
+              <a:ext cx="6919174" cy="0"/>
             </a:xfrm>
             <a:custGeom>
               <a:avLst/>
               <a:pathLst>
-                <a:path w="6917431" h="0">
+                <a:path w="6919174" h="0">
                   <a:moveTo>
                     <a:pt x="0" y="0"/>
                   </a:moveTo>
                   <a:lnTo>
-                    <a:pt x="6917431" y="0"/>
-                  </a:lnTo>
-                  <a:lnTo>
-                    <a:pt x="6917431" y="0"/>
+                    <a:pt x="6919174" y="0"/>
+                  </a:lnTo>
+                  <a:lnTo>
+                    <a:pt x="6919174" y="0"/>
                   </a:lnTo>
                 </a:path>
               </a:pathLst>
@@ -3562,15 +3562,15 @@
           </p:nvSpPr>
           <p:spPr>
             <a:xfrm>
-              <a:off x="2019661" y="1590617"/>
-              <a:ext cx="0" cy="4055309"/>
+              <a:off x="2017917" y="1590617"/>
+              <a:ext cx="0" cy="4059006"/>
             </a:xfrm>
             <a:custGeom>
               <a:avLst/>
               <a:pathLst>
-                <a:path w="0" h="4055309">
+                <a:path w="0" h="4059006">
                   <a:moveTo>
-                    <a:pt x="0" y="4055309"/>
+                    <a:pt x="0" y="4059006"/>
                   </a:moveTo>
                   <a:lnTo>
                     <a:pt x="0" y="0"/>
@@ -3605,15 +3605,15 @@
           </p:nvSpPr>
           <p:spPr>
             <a:xfrm>
-              <a:off x="3616880" y="1590617"/>
-              <a:ext cx="0" cy="4055309"/>
+              <a:off x="3615540" y="1590617"/>
+              <a:ext cx="0" cy="4059006"/>
             </a:xfrm>
             <a:custGeom>
               <a:avLst/>
               <a:pathLst>
-                <a:path w="0" h="4055309">
+                <a:path w="0" h="4059006">
                   <a:moveTo>
-                    <a:pt x="0" y="4055309"/>
+                    <a:pt x="0" y="4059006"/>
                   </a:moveTo>
                   <a:lnTo>
                     <a:pt x="0" y="0"/>
@@ -3648,15 +3648,15 @@
           </p:nvSpPr>
           <p:spPr>
             <a:xfrm>
-              <a:off x="5214100" y="1590617"/>
-              <a:ext cx="0" cy="4055309"/>
+              <a:off x="5213162" y="1590617"/>
+              <a:ext cx="0" cy="4059006"/>
             </a:xfrm>
             <a:custGeom>
               <a:avLst/>
               <a:pathLst>
-                <a:path w="0" h="4055309">
+                <a:path w="0" h="4059006">
                   <a:moveTo>
-                    <a:pt x="0" y="4055309"/>
+                    <a:pt x="0" y="4059006"/>
                   </a:moveTo>
                   <a:lnTo>
                     <a:pt x="0" y="0"/>
@@ -3691,15 +3691,15 @@
           </p:nvSpPr>
           <p:spPr>
             <a:xfrm>
-              <a:off x="6811320" y="1590617"/>
-              <a:ext cx="0" cy="4055309"/>
+              <a:off x="6810784" y="1590617"/>
+              <a:ext cx="0" cy="4059006"/>
             </a:xfrm>
             <a:custGeom>
               <a:avLst/>
               <a:pathLst>
-                <a:path w="0" h="4055309">
+                <a:path w="0" h="4059006">
                   <a:moveTo>
-                    <a:pt x="0" y="4055309"/>
+                    <a:pt x="0" y="4059006"/>
                   </a:moveTo>
                   <a:lnTo>
                     <a:pt x="0" y="0"/>
@@ -3734,15 +3734,15 @@
           </p:nvSpPr>
           <p:spPr>
             <a:xfrm>
-              <a:off x="8408540" y="1590617"/>
-              <a:ext cx="0" cy="4055309"/>
+              <a:off x="8408407" y="1590617"/>
+              <a:ext cx="0" cy="4059006"/>
             </a:xfrm>
             <a:custGeom>
               <a:avLst/>
               <a:pathLst>
-                <a:path w="0" h="4055309">
+                <a:path w="0" h="4059006">
                   <a:moveTo>
-                    <a:pt x="0" y="4055309"/>
+                    <a:pt x="0" y="4059006"/>
                   </a:moveTo>
                   <a:lnTo>
                     <a:pt x="0" y="0"/>
@@ -3777,8 +3777,8 @@
           </p:nvSpPr>
           <p:spPr>
             <a:xfrm>
-              <a:off x="2019661" y="1735449"/>
-              <a:ext cx="6781795" cy="868994"/>
+              <a:off x="2017917" y="1735581"/>
+              <a:ext cx="6783504" cy="869787"/>
             </a:xfrm>
             <a:prstGeom prst="rect">
               <a:avLst/>
@@ -3803,8 +3803,8 @@
           </p:nvSpPr>
           <p:spPr>
             <a:xfrm>
-              <a:off x="2019661" y="2700999"/>
-              <a:ext cx="4718187" cy="868994"/>
+              <a:off x="2017917" y="2702011"/>
+              <a:ext cx="4719376" cy="869787"/>
             </a:xfrm>
             <a:prstGeom prst="rect">
               <a:avLst/>
@@ -3829,8 +3829,8 @@
           </p:nvSpPr>
           <p:spPr>
             <a:xfrm>
-              <a:off x="2019661" y="3666549"/>
-              <a:ext cx="4663881" cy="868994"/>
+              <a:off x="2017917" y="3668441"/>
+              <a:ext cx="4665057" cy="869787"/>
             </a:xfrm>
             <a:prstGeom prst="rect">
               <a:avLst/>
@@ -3855,8 +3855,8 @@
           </p:nvSpPr>
           <p:spPr>
             <a:xfrm>
-              <a:off x="2019661" y="4632099"/>
-              <a:ext cx="942359" cy="868994"/>
+              <a:off x="2017917" y="4634872"/>
+              <a:ext cx="942597" cy="869787"/>
             </a:xfrm>
             <a:prstGeom prst="rect">
               <a:avLst/>
@@ -3881,7 +3881,7 @@
           </p:nvSpPr>
           <p:spPr>
             <a:xfrm>
-              <a:off x="8443318" y="2105089"/>
+              <a:off x="8443247" y="2105617"/>
               <a:ext cx="99512" cy="96971"/>
             </a:xfrm>
             <a:custGeom>
@@ -4065,7 +4065,7 @@
           </p:nvSpPr>
           <p:spPr>
             <a:xfrm>
-              <a:off x="8554687" y="2104665"/>
+              <a:off x="8554616" y="2105194"/>
               <a:ext cx="92313" cy="96971"/>
             </a:xfrm>
             <a:custGeom>
@@ -4348,7 +4348,7 @@
           </p:nvSpPr>
           <p:spPr>
             <a:xfrm>
-              <a:off x="5541265" y="3069368"/>
+              <a:off x="5540674" y="3070777"/>
               <a:ext cx="96548" cy="15244"/>
             </a:xfrm>
             <a:custGeom>
@@ -4430,7 +4430,7 @@
           </p:nvSpPr>
           <p:spPr>
             <a:xfrm>
-              <a:off x="5556086" y="3090965"/>
+              <a:off x="5555495" y="3092373"/>
               <a:ext cx="66059" cy="22019"/>
             </a:xfrm>
             <a:custGeom>
@@ -4473,7 +4473,7 @@
           </p:nvSpPr>
           <p:spPr>
             <a:xfrm>
-              <a:off x="5564555" y="3098163"/>
+              <a:off x="5563964" y="3099572"/>
               <a:ext cx="49121" cy="7622"/>
             </a:xfrm>
             <a:custGeom>
@@ -4516,7 +4516,7 @@
           </p:nvSpPr>
           <p:spPr>
             <a:xfrm>
-              <a:off x="5544653" y="3118913"/>
+              <a:off x="5544062" y="3120321"/>
               <a:ext cx="89349" cy="49121"/>
             </a:xfrm>
             <a:custGeom>
@@ -4721,7 +4721,7 @@
           </p:nvSpPr>
           <p:spPr>
             <a:xfrm>
-              <a:off x="5565402" y="3132463"/>
+              <a:off x="5564811" y="3133872"/>
               <a:ext cx="47427" cy="22866"/>
             </a:xfrm>
             <a:custGeom>
@@ -4764,7 +4764,7 @@
           </p:nvSpPr>
           <p:spPr>
             <a:xfrm>
-              <a:off x="5573448" y="3139239"/>
+              <a:off x="5572857" y="3140647"/>
               <a:ext cx="31335" cy="8892"/>
             </a:xfrm>
             <a:custGeom>
@@ -4807,7 +4807,7 @@
           </p:nvSpPr>
           <p:spPr>
             <a:xfrm>
-              <a:off x="5655599" y="3069792"/>
+              <a:off x="5655008" y="3071200"/>
               <a:ext cx="85114" cy="98665"/>
             </a:xfrm>
             <a:custGeom>
@@ -4886,7 +4886,7 @@
           </p:nvSpPr>
           <p:spPr>
             <a:xfrm>
-              <a:off x="5664068" y="3094352"/>
+              <a:off x="5663477" y="3095761"/>
               <a:ext cx="29218" cy="29218"/>
             </a:xfrm>
             <a:custGeom>
@@ -4929,7 +4929,7 @@
           </p:nvSpPr>
           <p:spPr>
             <a:xfrm>
-              <a:off x="5701755" y="3094352"/>
+              <a:off x="5701164" y="3095761"/>
               <a:ext cx="30488" cy="29218"/>
             </a:xfrm>
             <a:custGeom>
@@ -4972,7 +4972,7 @@
           </p:nvSpPr>
           <p:spPr>
             <a:xfrm>
-              <a:off x="5753205" y="3080484"/>
+              <a:off x="5752614" y="3081893"/>
               <a:ext cx="38269" cy="77386"/>
             </a:xfrm>
             <a:custGeom>
@@ -5015,7 +5015,7 @@
           </p:nvSpPr>
           <p:spPr>
             <a:xfrm>
-              <a:off x="5804444" y="3069792"/>
+              <a:off x="5803853" y="3071200"/>
               <a:ext cx="85114" cy="98665"/>
             </a:xfrm>
             <a:custGeom>
@@ -5094,7 +5094,7 @@
           </p:nvSpPr>
           <p:spPr>
             <a:xfrm>
-              <a:off x="5812913" y="3094352"/>
+              <a:off x="5812322" y="3095761"/>
               <a:ext cx="29218" cy="29218"/>
             </a:xfrm>
             <a:custGeom>
@@ -5137,7 +5137,7 @@
           </p:nvSpPr>
           <p:spPr>
             <a:xfrm>
-              <a:off x="5850601" y="3094352"/>
+              <a:off x="5850009" y="3095761"/>
               <a:ext cx="30488" cy="29218"/>
             </a:xfrm>
             <a:custGeom>
@@ -5180,7 +5180,7 @@
           </p:nvSpPr>
           <p:spPr>
             <a:xfrm>
-              <a:off x="5908614" y="3070215"/>
+              <a:off x="5908023" y="3071624"/>
               <a:ext cx="92313" cy="96971"/>
             </a:xfrm>
             <a:custGeom>
@@ -5463,7 +5463,7 @@
           </p:nvSpPr>
           <p:spPr>
             <a:xfrm>
-              <a:off x="6010456" y="3080484"/>
+              <a:off x="6009865" y="3081893"/>
               <a:ext cx="38269" cy="77386"/>
             </a:xfrm>
             <a:custGeom>
@@ -5506,7 +5506,7 @@
           </p:nvSpPr>
           <p:spPr>
             <a:xfrm>
-              <a:off x="6054495" y="3070215"/>
+              <a:off x="6053904" y="3071624"/>
               <a:ext cx="36840" cy="97395"/>
             </a:xfrm>
             <a:custGeom>
@@ -5801,7 +5801,7 @@
           </p:nvSpPr>
           <p:spPr>
             <a:xfrm>
-              <a:off x="6090912" y="3070215"/>
+              <a:off x="6090321" y="3071624"/>
               <a:ext cx="62671" cy="97818"/>
             </a:xfrm>
             <a:custGeom>
@@ -6066,7 +6066,7 @@
           </p:nvSpPr>
           <p:spPr>
             <a:xfrm>
-              <a:off x="6109968" y="3118913"/>
+              <a:off x="6109377" y="3120321"/>
               <a:ext cx="26254" cy="20749"/>
             </a:xfrm>
             <a:custGeom>
@@ -6160,7 +6160,7 @@
           </p:nvSpPr>
           <p:spPr>
             <a:xfrm>
-              <a:off x="6162053" y="3070215"/>
+              <a:off x="6161462" y="3071624"/>
               <a:ext cx="38958" cy="97395"/>
             </a:xfrm>
             <a:custGeom>
@@ -6356,7 +6356,7 @@
           </p:nvSpPr>
           <p:spPr>
             <a:xfrm>
-              <a:off x="6203129" y="3071062"/>
+              <a:off x="6202537" y="3072471"/>
               <a:ext cx="56743" cy="21172"/>
             </a:xfrm>
             <a:custGeom>
@@ -6465,7 +6465,7 @@
           </p:nvSpPr>
           <p:spPr>
             <a:xfrm>
-              <a:off x="6199317" y="3096470"/>
+              <a:off x="6198726" y="3097878"/>
               <a:ext cx="24983" cy="23290"/>
             </a:xfrm>
             <a:custGeom>
@@ -6562,7 +6562,7 @@
           </p:nvSpPr>
           <p:spPr>
             <a:xfrm>
-              <a:off x="6237852" y="3097740"/>
+              <a:off x="6237261" y="3099148"/>
               <a:ext cx="23713" cy="21596"/>
             </a:xfrm>
             <a:custGeom>
@@ -6659,7 +6659,7 @@
           </p:nvSpPr>
           <p:spPr>
             <a:xfrm>
-              <a:off x="6197200" y="3115949"/>
+              <a:off x="6196609" y="3117357"/>
               <a:ext cx="64788" cy="52085"/>
             </a:xfrm>
             <a:custGeom>
@@ -6942,7 +6942,7 @@
           </p:nvSpPr>
           <p:spPr>
             <a:xfrm>
-              <a:off x="6272152" y="3074026"/>
+              <a:off x="6271561" y="3075435"/>
               <a:ext cx="97818" cy="94007"/>
             </a:xfrm>
             <a:custGeom>
@@ -7315,7 +7315,7 @@
           </p:nvSpPr>
           <p:spPr>
             <a:xfrm>
-              <a:off x="6412740" y="3070215"/>
+              <a:off x="6412149" y="3071624"/>
               <a:ext cx="65212" cy="97395"/>
             </a:xfrm>
             <a:custGeom>
@@ -7568,7 +7568,7 @@
           </p:nvSpPr>
           <p:spPr>
             <a:xfrm>
-              <a:off x="6389026" y="3074450"/>
+              <a:off x="6388435" y="3075858"/>
               <a:ext cx="38958" cy="77916"/>
             </a:xfrm>
             <a:custGeom>
@@ -7674,7 +7674,7 @@
           </p:nvSpPr>
           <p:spPr>
             <a:xfrm>
-              <a:off x="6408082" y="3080378"/>
+              <a:off x="6407491" y="3081787"/>
               <a:ext cx="24983" cy="33876"/>
             </a:xfrm>
             <a:custGeom>
@@ -7771,7 +7771,7 @@
           </p:nvSpPr>
           <p:spPr>
             <a:xfrm>
-              <a:off x="6491079" y="3076144"/>
+              <a:off x="6490488" y="3077552"/>
               <a:ext cx="93584" cy="91466"/>
             </a:xfrm>
             <a:custGeom>
@@ -7892,7 +7892,7 @@
           </p:nvSpPr>
           <p:spPr>
             <a:xfrm>
-              <a:off x="5783380" y="4036189"/>
+              <a:off x="5782775" y="4038477"/>
               <a:ext cx="99512" cy="96971"/>
             </a:xfrm>
             <a:custGeom>
@@ -8076,7 +8076,7 @@
           </p:nvSpPr>
           <p:spPr>
             <a:xfrm>
-              <a:off x="5933707" y="4034918"/>
+              <a:off x="5933102" y="4037207"/>
               <a:ext cx="14397" cy="16514"/>
             </a:xfrm>
             <a:custGeom>
@@ -8173,7 +8173,7 @@
           </p:nvSpPr>
           <p:spPr>
             <a:xfrm>
-              <a:off x="5895596" y="4035765"/>
+              <a:off x="5894991" y="4038054"/>
               <a:ext cx="91043" cy="38958"/>
             </a:xfrm>
             <a:custGeom>
@@ -8294,7 +8294,7 @@
           </p:nvSpPr>
           <p:spPr>
             <a:xfrm>
-              <a:off x="5906182" y="4037036"/>
+              <a:off x="5905577" y="4039324"/>
               <a:ext cx="16091" cy="15667"/>
             </a:xfrm>
             <a:custGeom>
@@ -8391,7 +8391,7 @@
           </p:nvSpPr>
           <p:spPr>
             <a:xfrm>
-              <a:off x="5892632" y="4073029"/>
+              <a:off x="5892027" y="4075318"/>
               <a:ext cx="97395" cy="60130"/>
             </a:xfrm>
             <a:custGeom>
@@ -8677,7 +8677,7 @@
           </p:nvSpPr>
           <p:spPr>
             <a:xfrm>
-              <a:off x="6000190" y="4035342"/>
+              <a:off x="5999585" y="4037630"/>
               <a:ext cx="98665" cy="97818"/>
             </a:xfrm>
             <a:custGeom>
@@ -8924,7 +8924,7 @@
           </p:nvSpPr>
           <p:spPr>
             <a:xfrm>
-              <a:off x="6106901" y="4035342"/>
+              <a:off x="6106296" y="4037630"/>
               <a:ext cx="42345" cy="97818"/>
             </a:xfrm>
             <a:custGeom>
@@ -9186,7 +9186,7 @@
           </p:nvSpPr>
           <p:spPr>
             <a:xfrm>
-              <a:off x="6152211" y="4035765"/>
+              <a:off x="6151606" y="4038054"/>
               <a:ext cx="55049" cy="97395"/>
             </a:xfrm>
             <a:custGeom>
@@ -9253,7 +9253,7 @@
           </p:nvSpPr>
           <p:spPr>
             <a:xfrm>
-              <a:off x="6157292" y="4043811"/>
+              <a:off x="6156687" y="4046100"/>
               <a:ext cx="24560" cy="21172"/>
             </a:xfrm>
             <a:custGeom>
@@ -9350,7 +9350,7 @@
           </p:nvSpPr>
           <p:spPr>
             <a:xfrm>
-              <a:off x="6150517" y="4067948"/>
+              <a:off x="6149912" y="4070237"/>
               <a:ext cx="23713" cy="19055"/>
             </a:xfrm>
             <a:custGeom>
@@ -9447,7 +9447,7 @@
           </p:nvSpPr>
           <p:spPr>
             <a:xfrm>
-              <a:off x="6218694" y="4035342"/>
+              <a:off x="6218089" y="4037630"/>
               <a:ext cx="99512" cy="97818"/>
             </a:xfrm>
             <a:custGeom>
@@ -9901,7 +9901,7 @@
           </p:nvSpPr>
           <p:spPr>
             <a:xfrm>
-              <a:off x="6292798" y="4035342"/>
+              <a:off x="6292194" y="4037630"/>
               <a:ext cx="15244" cy="15244"/>
             </a:xfrm>
             <a:custGeom>
@@ -9998,7 +9998,7 @@
           </p:nvSpPr>
           <p:spPr>
             <a:xfrm>
-              <a:off x="6225892" y="4068795"/>
+              <a:off x="6225287" y="4071083"/>
               <a:ext cx="36417" cy="31759"/>
             </a:xfrm>
             <a:custGeom>
@@ -10041,7 +10041,7 @@
           </p:nvSpPr>
           <p:spPr>
             <a:xfrm>
-              <a:off x="6234361" y="4076840"/>
+              <a:off x="6233757" y="4079129"/>
               <a:ext cx="19479" cy="15667"/>
             </a:xfrm>
             <a:custGeom>
@@ -10084,7 +10084,7 @@
           </p:nvSpPr>
           <p:spPr>
             <a:xfrm>
-              <a:off x="6219540" y="4107753"/>
+              <a:off x="6218936" y="4110042"/>
               <a:ext cx="48697" cy="19055"/>
             </a:xfrm>
             <a:custGeom>
@@ -10181,7 +10181,7 @@
           </p:nvSpPr>
           <p:spPr>
             <a:xfrm>
-              <a:off x="6358434" y="4035765"/>
+              <a:off x="6357830" y="4038054"/>
               <a:ext cx="65212" cy="97395"/>
             </a:xfrm>
             <a:custGeom>
@@ -10434,7 +10434,7 @@
           </p:nvSpPr>
           <p:spPr>
             <a:xfrm>
-              <a:off x="6334721" y="4040000"/>
+              <a:off x="6334116" y="4042288"/>
               <a:ext cx="38958" cy="77916"/>
             </a:xfrm>
             <a:custGeom>
@@ -10540,7 +10540,7 @@
           </p:nvSpPr>
           <p:spPr>
             <a:xfrm>
-              <a:off x="6353776" y="4045928"/>
+              <a:off x="6353172" y="4048217"/>
               <a:ext cx="24983" cy="33876"/>
             </a:xfrm>
             <a:custGeom>
@@ -10637,7 +10637,7 @@
           </p:nvSpPr>
           <p:spPr>
             <a:xfrm>
-              <a:off x="6437621" y="4037459"/>
+              <a:off x="6437016" y="4039748"/>
               <a:ext cx="92313" cy="91043"/>
             </a:xfrm>
             <a:custGeom>
@@ -10704,7 +10704,7 @@
           </p:nvSpPr>
           <p:spPr>
             <a:xfrm>
-              <a:off x="3137225" y="5016231"/>
+              <a:off x="3135756" y="5019400"/>
               <a:ext cx="30488" cy="97395"/>
             </a:xfrm>
             <a:custGeom>
@@ -10897,7 +10897,7 @@
           </p:nvSpPr>
           <p:spPr>
             <a:xfrm>
-              <a:off x="3114782" y="5036981"/>
+              <a:off x="3113312" y="5040150"/>
               <a:ext cx="27948" cy="57166"/>
             </a:xfrm>
             <a:custGeom>
@@ -10994,7 +10994,7 @@
           </p:nvSpPr>
           <p:spPr>
             <a:xfrm>
-              <a:off x="3182111" y="5036981"/>
+              <a:off x="3180642" y="5040150"/>
               <a:ext cx="28795" cy="56743"/>
             </a:xfrm>
             <a:custGeom>
@@ -11091,7 +11091,7 @@
           </p:nvSpPr>
           <p:spPr>
             <a:xfrm>
-              <a:off x="3262992" y="5015384"/>
+              <a:off x="3261522" y="5018553"/>
               <a:ext cx="14397" cy="16514"/>
             </a:xfrm>
             <a:custGeom>
@@ -11188,7 +11188,7 @@
           </p:nvSpPr>
           <p:spPr>
             <a:xfrm>
-              <a:off x="3224880" y="5016231"/>
+              <a:off x="3223411" y="5019400"/>
               <a:ext cx="91043" cy="38958"/>
             </a:xfrm>
             <a:custGeom>
@@ -11309,7 +11309,7 @@
           </p:nvSpPr>
           <p:spPr>
             <a:xfrm>
-              <a:off x="3235467" y="5017502"/>
+              <a:off x="3233998" y="5020671"/>
               <a:ext cx="16091" cy="15667"/>
             </a:xfrm>
             <a:custGeom>
@@ -11406,7 +11406,7 @@
           </p:nvSpPr>
           <p:spPr>
             <a:xfrm>
-              <a:off x="3221916" y="5053495"/>
+              <a:off x="3220447" y="5056664"/>
               <a:ext cx="97395" cy="60130"/>
             </a:xfrm>
             <a:custGeom>
@@ -11692,7 +11692,7 @@
           </p:nvSpPr>
           <p:spPr>
             <a:xfrm>
-              <a:off x="3325875" y="5026500"/>
+              <a:off x="3324406" y="5029669"/>
               <a:ext cx="38269" cy="77386"/>
             </a:xfrm>
             <a:custGeom>
@@ -11735,7 +11735,7 @@
           </p:nvSpPr>
           <p:spPr>
             <a:xfrm>
-              <a:off x="3369067" y="5016655"/>
+              <a:off x="3367598" y="5019824"/>
               <a:ext cx="46156" cy="97395"/>
             </a:xfrm>
             <a:custGeom>
@@ -12078,7 +12078,7 @@
           </p:nvSpPr>
           <p:spPr>
             <a:xfrm>
-              <a:off x="3399556" y="5021313"/>
+              <a:off x="3398087" y="5024482"/>
               <a:ext cx="63942" cy="92313"/>
             </a:xfrm>
             <a:custGeom>
@@ -12433,7 +12433,7 @@
           </p:nvSpPr>
           <p:spPr>
             <a:xfrm>
-              <a:off x="3485518" y="5015808"/>
+              <a:off x="3484049" y="5018977"/>
               <a:ext cx="85114" cy="98665"/>
             </a:xfrm>
             <a:custGeom>
@@ -12512,7 +12512,7 @@
           </p:nvSpPr>
           <p:spPr>
             <a:xfrm>
-              <a:off x="3493987" y="5040368"/>
+              <a:off x="3492518" y="5043537"/>
               <a:ext cx="29218" cy="29218"/>
             </a:xfrm>
             <a:custGeom>
@@ -12555,7 +12555,7 @@
           </p:nvSpPr>
           <p:spPr>
             <a:xfrm>
-              <a:off x="3531675" y="5040368"/>
+              <a:off x="3530206" y="5043537"/>
               <a:ext cx="30488" cy="29218"/>
             </a:xfrm>
             <a:custGeom>
@@ -12598,7 +12598,7 @@
           </p:nvSpPr>
           <p:spPr>
             <a:xfrm>
-              <a:off x="3587571" y="5020042"/>
+              <a:off x="3586102" y="5023211"/>
               <a:ext cx="97818" cy="94007"/>
             </a:xfrm>
             <a:custGeom>
@@ -12971,7 +12971,7 @@
           </p:nvSpPr>
           <p:spPr>
             <a:xfrm>
-              <a:off x="3728159" y="5016231"/>
+              <a:off x="3726690" y="5019400"/>
               <a:ext cx="65212" cy="97395"/>
             </a:xfrm>
             <a:custGeom>
@@ -13224,7 +13224,7 @@
           </p:nvSpPr>
           <p:spPr>
             <a:xfrm>
-              <a:off x="3704445" y="5020466"/>
+              <a:off x="3702976" y="5023635"/>
               <a:ext cx="38958" cy="77916"/>
             </a:xfrm>
             <a:custGeom>
@@ -13330,7 +13330,7 @@
           </p:nvSpPr>
           <p:spPr>
             <a:xfrm>
-              <a:off x="3723501" y="5026394"/>
+              <a:off x="3722032" y="5029563"/>
               <a:ext cx="24983" cy="33876"/>
             </a:xfrm>
             <a:custGeom>
@@ -13427,7 +13427,7 @@
           </p:nvSpPr>
           <p:spPr>
             <a:xfrm>
-              <a:off x="3806499" y="5022160"/>
+              <a:off x="3805029" y="5025329"/>
               <a:ext cx="93584" cy="91466"/>
             </a:xfrm>
             <a:custGeom>
@@ -13548,8 +13548,8 @@
           </p:nvSpPr>
           <p:spPr>
             <a:xfrm>
-              <a:off x="2019661" y="1590617"/>
-              <a:ext cx="6917431" cy="4055309"/>
+              <a:off x="2017917" y="1590617"/>
+              <a:ext cx="6919174" cy="4059006"/>
             </a:xfrm>
             <a:prstGeom prst="rect">
               <a:avLst/>
@@ -13578,7 +13578,7 @@
           </p:nvSpPr>
           <p:spPr>
             <a:xfrm>
-              <a:off x="1924402" y="5028151"/>
+              <a:off x="1922659" y="5031320"/>
               <a:ext cx="59863" cy="76889"/>
             </a:xfrm>
             <a:custGeom>
@@ -13642,7 +13642,7 @@
           </p:nvSpPr>
           <p:spPr>
             <a:xfrm>
-              <a:off x="1936899" y="5042138"/>
+              <a:off x="1935155" y="5045307"/>
               <a:ext cx="22952" cy="35836"/>
             </a:xfrm>
             <a:custGeom>
@@ -13919,7 +13919,7 @@
           </p:nvSpPr>
           <p:spPr>
             <a:xfrm>
-              <a:off x="1925275" y="4061456"/>
+              <a:off x="1923532" y="4063744"/>
               <a:ext cx="55552" cy="79290"/>
             </a:xfrm>
             <a:custGeom>
@@ -14842,7 +14842,7 @@
                     <a:pt x="26919" y="13"/>
                   </a:lnTo>
                   <a:lnTo>
-                    <a:pt x="27939" y="0"/>
+                    <a:pt x="27940" y="0"/>
                   </a:lnTo>
                   <a:lnTo>
                     <a:pt x="29274" y="16"/>
@@ -15228,7 +15228,7 @@
           </p:nvSpPr>
           <p:spPr>
             <a:xfrm>
-              <a:off x="1926585" y="3095906"/>
+              <a:off x="1924841" y="3097314"/>
               <a:ext cx="53806" cy="78035"/>
             </a:xfrm>
             <a:custGeom>
@@ -15994,7 +15994,7 @@
           </p:nvSpPr>
           <p:spPr>
             <a:xfrm>
-              <a:off x="1929750" y="2131502"/>
+              <a:off x="1928007" y="2132030"/>
               <a:ext cx="52005" cy="76889"/>
             </a:xfrm>
             <a:custGeom>
@@ -16058,7 +16058,7 @@
           </p:nvSpPr>
           <p:spPr>
             <a:xfrm>
-              <a:off x="1984866" y="5066596"/>
+              <a:off x="1983123" y="5069765"/>
               <a:ext cx="34794" cy="0"/>
             </a:xfrm>
             <a:custGeom>
@@ -16098,7 +16098,7 @@
           </p:nvSpPr>
           <p:spPr>
             <a:xfrm>
-              <a:off x="1984866" y="4101046"/>
+              <a:off x="1983123" y="4103335"/>
               <a:ext cx="34794" cy="0"/>
             </a:xfrm>
             <a:custGeom>
@@ -16138,7 +16138,7 @@
           </p:nvSpPr>
           <p:spPr>
             <a:xfrm>
-              <a:off x="1984866" y="3135496"/>
+              <a:off x="1983123" y="3136905"/>
               <a:ext cx="34794" cy="0"/>
             </a:xfrm>
             <a:custGeom>
@@ -16178,7 +16178,7 @@
           </p:nvSpPr>
           <p:spPr>
             <a:xfrm>
-              <a:off x="1984866" y="2169947"/>
+              <a:off x="1983123" y="2170475"/>
               <a:ext cx="34794" cy="0"/>
             </a:xfrm>
             <a:custGeom>
@@ -16218,7 +16218,7 @@
           </p:nvSpPr>
           <p:spPr>
             <a:xfrm>
-              <a:off x="2019661" y="5645926"/>
+              <a:off x="2017917" y="5649623"/>
               <a:ext cx="0" cy="34794"/>
             </a:xfrm>
             <a:custGeom>
@@ -16258,7 +16258,7 @@
           </p:nvSpPr>
           <p:spPr>
             <a:xfrm>
-              <a:off x="3616880" y="5645926"/>
+              <a:off x="3615540" y="5649623"/>
               <a:ext cx="0" cy="34794"/>
             </a:xfrm>
             <a:custGeom>
@@ -16298,7 +16298,7 @@
           </p:nvSpPr>
           <p:spPr>
             <a:xfrm>
-              <a:off x="5214100" y="5645926"/>
+              <a:off x="5213162" y="5649623"/>
               <a:ext cx="0" cy="34794"/>
             </a:xfrm>
             <a:custGeom>
@@ -16338,7 +16338,7 @@
           </p:nvSpPr>
           <p:spPr>
             <a:xfrm>
-              <a:off x="6811320" y="5645926"/>
+              <a:off x="6810784" y="5649623"/>
               <a:ext cx="0" cy="34794"/>
             </a:xfrm>
             <a:custGeom>
@@ -16378,7 +16378,7 @@
           </p:nvSpPr>
           <p:spPr>
             <a:xfrm>
-              <a:off x="8408540" y="5645926"/>
+              <a:off x="8408407" y="5649623"/>
               <a:ext cx="0" cy="34794"/>
             </a:xfrm>
             <a:custGeom>
@@ -16418,7 +16418,7 @@
           </p:nvSpPr>
           <p:spPr>
             <a:xfrm>
-              <a:off x="1992948" y="5707410"/>
+              <a:off x="1991205" y="5711107"/>
               <a:ext cx="53424" cy="79126"/>
             </a:xfrm>
             <a:custGeom>
@@ -16861,7 +16861,7 @@
                     <a:pt x="48312" y="12306"/>
                   </a:lnTo>
                   <a:lnTo>
-                    <a:pt x="48894" y="13492"/>
+                    <a:pt x="48895" y="13492"/>
                   </a:lnTo>
                   <a:lnTo>
                     <a:pt x="49447" y="14740"/>
@@ -16929,7 +16929,7 @@
           </p:nvSpPr>
           <p:spPr>
             <a:xfrm>
-              <a:off x="2002880" y="5715377"/>
+              <a:off x="2001137" y="5719075"/>
               <a:ext cx="33506" cy="63137"/>
             </a:xfrm>
             <a:custGeom>
@@ -17440,7 +17440,7 @@
           </p:nvSpPr>
           <p:spPr>
             <a:xfrm>
-              <a:off x="3528122" y="5708556"/>
+              <a:off x="3526781" y="5712253"/>
               <a:ext cx="52987" cy="77980"/>
             </a:xfrm>
             <a:custGeom>
@@ -18392,7 +18392,7 @@
           </p:nvSpPr>
           <p:spPr>
             <a:xfrm>
-              <a:off x="3590168" y="5707410"/>
+              <a:off x="3588827" y="5711107"/>
               <a:ext cx="53424" cy="79126"/>
             </a:xfrm>
             <a:custGeom>
@@ -18903,7 +18903,7 @@
           </p:nvSpPr>
           <p:spPr>
             <a:xfrm>
-              <a:off x="3600100" y="5715377"/>
+              <a:off x="3598759" y="5719075"/>
               <a:ext cx="33506" cy="63137"/>
             </a:xfrm>
             <a:custGeom>
@@ -19414,7 +19414,7 @@
           </p:nvSpPr>
           <p:spPr>
             <a:xfrm>
-              <a:off x="3652324" y="5707410"/>
+              <a:off x="3650983" y="5711107"/>
               <a:ext cx="53424" cy="79126"/>
             </a:xfrm>
             <a:custGeom>
@@ -19925,7 +19925,7 @@
           </p:nvSpPr>
           <p:spPr>
             <a:xfrm>
-              <a:off x="3662256" y="5715377"/>
+              <a:off x="3660915" y="5719075"/>
               <a:ext cx="33506" cy="63137"/>
             </a:xfrm>
             <a:custGeom>
@@ -20436,7 +20436,7 @@
           </p:nvSpPr>
           <p:spPr>
             <a:xfrm>
-              <a:off x="5098302" y="5708556"/>
+              <a:off x="5097364" y="5712253"/>
               <a:ext cx="48185" cy="76889"/>
             </a:xfrm>
             <a:custGeom>
@@ -20500,7 +20500,7 @@
           </p:nvSpPr>
           <p:spPr>
             <a:xfrm>
-              <a:off x="5156310" y="5707410"/>
+              <a:off x="5155372" y="5711107"/>
               <a:ext cx="53424" cy="79126"/>
             </a:xfrm>
             <a:custGeom>
@@ -21011,7 +21011,7 @@
           </p:nvSpPr>
           <p:spPr>
             <a:xfrm>
-              <a:off x="5166242" y="5715377"/>
+              <a:off x="5165304" y="5719075"/>
               <a:ext cx="33506" cy="63137"/>
             </a:xfrm>
             <a:custGeom>
@@ -21522,7 +21522,7 @@
           </p:nvSpPr>
           <p:spPr>
             <a:xfrm>
-              <a:off x="5218466" y="5707410"/>
+              <a:off x="5217528" y="5711107"/>
               <a:ext cx="53424" cy="79126"/>
             </a:xfrm>
             <a:custGeom>
@@ -22033,7 +22033,7 @@
           </p:nvSpPr>
           <p:spPr>
             <a:xfrm>
-              <a:off x="5228398" y="5715377"/>
+              <a:off x="5227459" y="5719075"/>
               <a:ext cx="33506" cy="63137"/>
             </a:xfrm>
             <a:custGeom>
@@ -22544,7 +22544,7 @@
           </p:nvSpPr>
           <p:spPr>
             <a:xfrm>
-              <a:off x="5280622" y="5707410"/>
+              <a:off x="5279683" y="5711107"/>
               <a:ext cx="53424" cy="79126"/>
             </a:xfrm>
             <a:custGeom>
@@ -23055,7 +23055,7 @@
           </p:nvSpPr>
           <p:spPr>
             <a:xfrm>
-              <a:off x="5290553" y="5715377"/>
+              <a:off x="5289615" y="5719075"/>
               <a:ext cx="33506" cy="63137"/>
             </a:xfrm>
             <a:custGeom>
@@ -23566,7 +23566,7 @@
           </p:nvSpPr>
           <p:spPr>
             <a:xfrm>
-              <a:off x="6695522" y="5708556"/>
+              <a:off x="6694986" y="5712253"/>
               <a:ext cx="48185" cy="76889"/>
             </a:xfrm>
             <a:custGeom>
@@ -23630,7 +23630,7 @@
           </p:nvSpPr>
           <p:spPr>
             <a:xfrm>
-              <a:off x="6753639" y="5708556"/>
+              <a:off x="6753104" y="5712253"/>
               <a:ext cx="52987" cy="77980"/>
             </a:xfrm>
             <a:custGeom>
@@ -24582,7 +24582,7 @@
           </p:nvSpPr>
           <p:spPr>
             <a:xfrm>
-              <a:off x="6815686" y="5707410"/>
+              <a:off x="6815150" y="5711107"/>
               <a:ext cx="53424" cy="79126"/>
             </a:xfrm>
             <a:custGeom>
@@ -25093,7 +25093,7 @@
           </p:nvSpPr>
           <p:spPr>
             <a:xfrm>
-              <a:off x="6825618" y="5715377"/>
+              <a:off x="6825082" y="5719075"/>
               <a:ext cx="33506" cy="63137"/>
             </a:xfrm>
             <a:custGeom>
@@ -25604,7 +25604,7 @@
           </p:nvSpPr>
           <p:spPr>
             <a:xfrm>
-              <a:off x="6877841" y="5707410"/>
+              <a:off x="6877306" y="5711107"/>
               <a:ext cx="53424" cy="79126"/>
             </a:xfrm>
             <a:custGeom>
@@ -26115,7 +26115,7 @@
           </p:nvSpPr>
           <p:spPr>
             <a:xfrm>
-              <a:off x="6887773" y="5715377"/>
+              <a:off x="6887237" y="5719075"/>
               <a:ext cx="33506" cy="63137"/>
             </a:xfrm>
             <a:custGeom>
@@ -26626,7 +26626,7 @@
           </p:nvSpPr>
           <p:spPr>
             <a:xfrm>
-              <a:off x="8289850" y="5707410"/>
+              <a:off x="8289716" y="5711107"/>
               <a:ext cx="50914" cy="78035"/>
             </a:xfrm>
             <a:custGeom>
@@ -27572,7 +27572,7 @@
           </p:nvSpPr>
           <p:spPr>
             <a:xfrm>
-              <a:off x="8350750" y="5707410"/>
+              <a:off x="8350617" y="5711107"/>
               <a:ext cx="53424" cy="79126"/>
             </a:xfrm>
             <a:custGeom>
@@ -28083,7 +28083,7 @@
           </p:nvSpPr>
           <p:spPr>
             <a:xfrm>
-              <a:off x="8360682" y="5715377"/>
+              <a:off x="8360549" y="5719075"/>
               <a:ext cx="33506" cy="63137"/>
             </a:xfrm>
             <a:custGeom>
@@ -28594,7 +28594,7 @@
           </p:nvSpPr>
           <p:spPr>
             <a:xfrm>
-              <a:off x="8412906" y="5707410"/>
+              <a:off x="8412772" y="5711107"/>
               <a:ext cx="53424" cy="79126"/>
             </a:xfrm>
             <a:custGeom>
@@ -29105,7 +29105,7 @@
           </p:nvSpPr>
           <p:spPr>
             <a:xfrm>
-              <a:off x="8422837" y="5715377"/>
+              <a:off x="8422704" y="5719075"/>
               <a:ext cx="33506" cy="63137"/>
             </a:xfrm>
             <a:custGeom>
@@ -29616,7 +29616,7 @@
           </p:nvSpPr>
           <p:spPr>
             <a:xfrm>
-              <a:off x="8475061" y="5707410"/>
+              <a:off x="8474928" y="5711107"/>
               <a:ext cx="53424" cy="79126"/>
             </a:xfrm>
             <a:custGeom>
@@ -30127,7 +30127,7 @@
           </p:nvSpPr>
           <p:spPr>
             <a:xfrm>
-              <a:off x="8484993" y="5715377"/>
+              <a:off x="8484860" y="5719075"/>
               <a:ext cx="33506" cy="63137"/>
             </a:xfrm>
             <a:custGeom>

</xml_diff>